<commit_message>
updated for the networking
</commit_message>
<xml_diff>
--- a/training/core_java/12_Training_CoreJava_Datbase_Fundamentals.pptx
+++ b/training/core_java/12_Training_CoreJava_Datbase_Fundamentals.pptx
@@ -51,8 +51,10 @@
     <p:sldId id="587" r:id="rId45"/>
     <p:sldId id="588" r:id="rId46"/>
     <p:sldId id="594" r:id="rId47"/>
-    <p:sldId id="595" r:id="rId48"/>
-    <p:sldId id="488" r:id="rId49"/>
+    <p:sldId id="596" r:id="rId48"/>
+    <p:sldId id="597" r:id="rId49"/>
+    <p:sldId id="595" r:id="rId50"/>
+    <p:sldId id="488" r:id="rId51"/>
   </p:sldIdLst>
   <p:sldSz cx="12192000" cy="6858000"/>
   <p:notesSz cx="6858000" cy="9144000"/>
@@ -335,7 +337,7 @@
           <a:p>
             <a:fld id="{96DFF08F-DC6B-4601-B491-B0F83F6DD2DA}" type="datetimeFigureOut">
               <a:rPr lang="en-US" dirty="0"/>
-              <a:t>10/28/2015</a:t>
+              <a:t>11/18/2015</a:t>
             </a:fld>
             <a:endParaRPr lang="en-US" dirty="0"/>
           </a:p>
@@ -500,7 +502,7 @@
           <a:p>
             <a:fld id="{96DFF08F-DC6B-4601-B491-B0F83F6DD2DA}" type="datetimeFigureOut">
               <a:rPr lang="en-US" dirty="0"/>
-              <a:t>10/28/2015</a:t>
+              <a:t>11/18/2015</a:t>
             </a:fld>
             <a:endParaRPr lang="en-US" dirty="0"/>
           </a:p>
@@ -718,7 +720,7 @@
           <a:p>
             <a:fld id="{96DFF08F-DC6B-4601-B491-B0F83F6DD2DA}" type="datetimeFigureOut">
               <a:rPr lang="en-US" dirty="0"/>
-              <a:t>10/28/2015</a:t>
+              <a:t>11/18/2015</a:t>
             </a:fld>
             <a:endParaRPr lang="en-US" dirty="0"/>
           </a:p>
@@ -893,7 +895,7 @@
           <a:p>
             <a:fld id="{96DFF08F-DC6B-4601-B491-B0F83F6DD2DA}" type="datetimeFigureOut">
               <a:rPr lang="en-US" dirty="0"/>
-              <a:t>10/28/2015</a:t>
+              <a:t>11/18/2015</a:t>
             </a:fld>
             <a:endParaRPr lang="en-US" dirty="0"/>
           </a:p>
@@ -1190,7 +1192,7 @@
             <a:fld id="{96DFF08F-DC6B-4601-B491-B0F83F6DD2DA}" type="datetimeFigureOut">
               <a:rPr lang="en-US" dirty="0"/>
               <a:pPr/>
-              <a:t>10/28/2015</a:t>
+              <a:t>11/18/2015</a:t>
             </a:fld>
             <a:endParaRPr lang="en-US" dirty="0"/>
           </a:p>
@@ -1490,7 +1492,7 @@
           <a:p>
             <a:fld id="{96DFF08F-DC6B-4601-B491-B0F83F6DD2DA}" type="datetimeFigureOut">
               <a:rPr lang="en-US" dirty="0"/>
-              <a:t>10/28/2015</a:t>
+              <a:t>11/18/2015</a:t>
             </a:fld>
             <a:endParaRPr lang="en-US" dirty="0"/>
           </a:p>
@@ -1907,7 +1909,7 @@
           <a:p>
             <a:fld id="{96DFF08F-DC6B-4601-B491-B0F83F6DD2DA}" type="datetimeFigureOut">
               <a:rPr lang="en-US" dirty="0"/>
-              <a:t>10/28/2015</a:t>
+              <a:t>11/18/2015</a:t>
             </a:fld>
             <a:endParaRPr lang="en-US" dirty="0"/>
           </a:p>
@@ -2020,7 +2022,7 @@
           <a:p>
             <a:fld id="{96DFF08F-DC6B-4601-B491-B0F83F6DD2DA}" type="datetimeFigureOut">
               <a:rPr lang="en-US" dirty="0"/>
-              <a:t>10/28/2015</a:t>
+              <a:t>11/18/2015</a:t>
             </a:fld>
             <a:endParaRPr lang="en-US" dirty="0"/>
           </a:p>
@@ -2110,7 +2112,7 @@
           <a:p>
             <a:fld id="{96DFF08F-DC6B-4601-B491-B0F83F6DD2DA}" type="datetimeFigureOut">
               <a:rPr lang="en-US" dirty="0"/>
-              <a:t>10/28/2015</a:t>
+              <a:t>11/18/2015</a:t>
             </a:fld>
             <a:endParaRPr lang="en-US" dirty="0"/>
           </a:p>
@@ -2378,7 +2380,7 @@
           <a:p>
             <a:fld id="{96DFF08F-DC6B-4601-B491-B0F83F6DD2DA}" type="datetimeFigureOut">
               <a:rPr lang="en-US" dirty="0"/>
-              <a:t>10/28/2015</a:t>
+              <a:t>11/18/2015</a:t>
             </a:fld>
             <a:endParaRPr lang="en-US" dirty="0"/>
           </a:p>
@@ -2638,7 +2640,7 @@
           <a:p>
             <a:fld id="{96DFF08F-DC6B-4601-B491-B0F83F6DD2DA}" type="datetimeFigureOut">
               <a:rPr lang="en-US" dirty="0"/>
-              <a:t>10/28/2015</a:t>
+              <a:t>11/18/2015</a:t>
             </a:fld>
             <a:endParaRPr lang="en-US" dirty="0"/>
           </a:p>
@@ -2886,7 +2888,7 @@
             <a:fld id="{96DFF08F-DC6B-4601-B491-B0F83F6DD2DA}" type="datetimeFigureOut">
               <a:rPr lang="en-US" dirty="0"/>
               <a:pPr/>
-              <a:t>10/28/2015</a:t>
+              <a:t>11/18/2015</a:t>
             </a:fld>
             <a:endParaRPr lang="en-US" dirty="0"/>
           </a:p>
@@ -6910,15 +6912,7 @@
                   <a:schemeClr val="bg1"/>
                 </a:solidFill>
               </a:rPr>
-              <a:t>SQL – </a:t>
-            </a:r>
-            <a:r>
-              <a:rPr lang="en-US" sz="3200" b="1" dirty="0" smtClean="0">
-                <a:solidFill>
-                  <a:schemeClr val="bg1"/>
-                </a:solidFill>
-              </a:rPr>
-              <a:t>CREATE DATABASE </a:t>
+              <a:t>SQL – CREATE DATABASE </a:t>
             </a:r>
             <a:endParaRPr lang="en-US" sz="3200" b="1" dirty="0">
               <a:solidFill>
@@ -7109,15 +7103,7 @@
                   <a:schemeClr val="bg1"/>
                 </a:solidFill>
               </a:rPr>
-              <a:t>	</a:t>
-            </a:r>
-            <a:r>
-              <a:rPr lang="en-US" sz="2400" dirty="0">
-                <a:solidFill>
-                  <a:schemeClr val="bg1"/>
-                </a:solidFill>
-              </a:rPr>
-              <a:t>CREATE DATABASE </a:t>
+              <a:t>	CREATE DATABASE </a:t>
             </a:r>
             <a:r>
               <a:rPr lang="en-US" sz="2400" dirty="0" err="1">
@@ -7420,15 +7406,7 @@
                   <a:schemeClr val="bg1"/>
                 </a:solidFill>
               </a:rPr>
-              <a:t>SQL – </a:t>
-            </a:r>
-            <a:r>
-              <a:rPr lang="en-US" sz="3200" b="1" dirty="0" smtClean="0">
-                <a:solidFill>
-                  <a:schemeClr val="bg1"/>
-                </a:solidFill>
-              </a:rPr>
-              <a:t>CREATE TABLE </a:t>
+              <a:t>SQL – CREATE TABLE </a:t>
             </a:r>
             <a:endParaRPr lang="en-US" sz="3200" b="1" dirty="0">
               <a:solidFill>
@@ -7619,15 +7597,7 @@
                   <a:schemeClr val="bg1"/>
                 </a:solidFill>
               </a:rPr>
-              <a:t>	</a:t>
-            </a:r>
-            <a:r>
-              <a:rPr lang="en-US" sz="2400" dirty="0">
-                <a:solidFill>
-                  <a:schemeClr val="bg1"/>
-                </a:solidFill>
-              </a:rPr>
-              <a:t>CREATE TABLE </a:t>
+              <a:t>	CREATE TABLE </a:t>
             </a:r>
             <a:r>
               <a:rPr lang="en-US" sz="2400" dirty="0" err="1">
@@ -8149,15 +8119,7 @@
                   <a:schemeClr val="bg1"/>
                 </a:solidFill>
               </a:rPr>
-              <a:t>SQL – </a:t>
-            </a:r>
-            <a:r>
-              <a:rPr lang="en-US" sz="3200" b="1" dirty="0" smtClean="0">
-                <a:solidFill>
-                  <a:schemeClr val="bg1"/>
-                </a:solidFill>
-              </a:rPr>
-              <a:t>CREATE TABLE + CONSTRAINT syntax </a:t>
+              <a:t>SQL – CREATE TABLE + CONSTRAINT syntax </a:t>
             </a:r>
             <a:endParaRPr lang="en-US" sz="3200" b="1" dirty="0">
               <a:solidFill>
@@ -8339,11 +8301,6 @@
               </a:rPr>
               <a:t>Constraints can be specified when the table is created (inside the CREATE TABLE statement) or after the table is created (inside the ALTER TABLE statement).</a:t>
             </a:r>
-            <a:endParaRPr lang="en-US" sz="2400" dirty="0">
-              <a:solidFill>
-                <a:schemeClr val="bg1"/>
-              </a:solidFill>
-            </a:endParaRPr>
           </a:p>
           <a:p>
             <a:pPr marL="342900" indent="-342900">
@@ -8567,11 +8524,6 @@
               </a:rPr>
               <a:t>);</a:t>
             </a:r>
-            <a:endParaRPr lang="en-US" sz="2400" dirty="0">
-              <a:solidFill>
-                <a:schemeClr val="bg1"/>
-              </a:solidFill>
-            </a:endParaRPr>
           </a:p>
         </p:txBody>
       </p:sp>
@@ -8793,15 +8745,7 @@
                   <a:schemeClr val="bg1"/>
                 </a:solidFill>
               </a:rPr>
-              <a:t>SQL – </a:t>
-            </a:r>
-            <a:r>
-              <a:rPr lang="en-US" sz="3200" b="1" dirty="0" smtClean="0">
-                <a:solidFill>
-                  <a:schemeClr val="bg1"/>
-                </a:solidFill>
-              </a:rPr>
-              <a:t>Constraints</a:t>
+              <a:t>SQL – Constraints</a:t>
             </a:r>
             <a:endParaRPr lang="en-US" sz="3200" b="1" dirty="0">
               <a:solidFill>
@@ -9673,11 +9617,6 @@
               </a:rPr>
               <a:t>,...);</a:t>
             </a:r>
-            <a:endParaRPr lang="en-US" sz="2400" dirty="0">
-              <a:solidFill>
-                <a:schemeClr val="bg1"/>
-              </a:solidFill>
-            </a:endParaRPr>
           </a:p>
         </p:txBody>
       </p:sp>
@@ -12934,11 +12873,6 @@
               </a:rPr>
               <a:t> ASC|DESC;</a:t>
             </a:r>
-            <a:endParaRPr lang="en-US" sz="2400" dirty="0">
-              <a:solidFill>
-                <a:schemeClr val="bg1"/>
-              </a:solidFill>
-            </a:endParaRPr>
           </a:p>
         </p:txBody>
       </p:sp>
@@ -13350,23 +13284,7 @@
                   <a:schemeClr val="bg1"/>
                 </a:solidFill>
               </a:rPr>
-              <a:t>SQL Commands – 	</a:t>
-            </a:r>
-            <a:r>
-              <a:rPr lang="en-US" sz="3200" b="1" dirty="0" smtClean="0">
-                <a:solidFill>
-                  <a:schemeClr val="bg1"/>
-                </a:solidFill>
-              </a:rPr>
-              <a:t>UPDATE </a:t>
-            </a:r>
-            <a:r>
-              <a:rPr lang="en-US" sz="3200" b="1" dirty="0" smtClean="0">
-                <a:solidFill>
-                  <a:schemeClr val="bg1"/>
-                </a:solidFill>
-              </a:rPr>
-              <a:t>statement</a:t>
+              <a:t>SQL Commands – 	UPDATE statement</a:t>
             </a:r>
             <a:endParaRPr lang="en-US" sz="3200" b="1" dirty="0">
               <a:solidFill>
@@ -13647,11 +13565,6 @@
               </a:rPr>
               <a:t>;</a:t>
             </a:r>
-            <a:endParaRPr lang="en-US" sz="2400" dirty="0">
-              <a:solidFill>
-                <a:schemeClr val="bg1"/>
-              </a:solidFill>
-            </a:endParaRPr>
           </a:p>
         </p:txBody>
       </p:sp>
@@ -14017,23 +13930,7 @@
                   <a:schemeClr val="bg1"/>
                 </a:solidFill>
               </a:rPr>
-              <a:t>SQL Commands – 	DELETE</a:t>
-            </a:r>
-            <a:r>
-              <a:rPr lang="en-US" sz="3200" b="1" dirty="0" smtClean="0">
-                <a:solidFill>
-                  <a:schemeClr val="bg1"/>
-                </a:solidFill>
-              </a:rPr>
-              <a:t> </a:t>
-            </a:r>
-            <a:r>
-              <a:rPr lang="en-US" sz="3200" b="1" dirty="0" smtClean="0">
-                <a:solidFill>
-                  <a:schemeClr val="bg1"/>
-                </a:solidFill>
-              </a:rPr>
-              <a:t>statement</a:t>
+              <a:t>SQL Commands – 	DELETE statement</a:t>
             </a:r>
             <a:endParaRPr lang="en-US" sz="3200" b="1" dirty="0">
               <a:solidFill>
@@ -14395,11 +14292,6 @@
               </a:rPr>
               <a:t>;</a:t>
             </a:r>
-            <a:endParaRPr lang="en-US" sz="2400" dirty="0">
-              <a:solidFill>
-                <a:schemeClr val="bg1"/>
-              </a:solidFill>
-            </a:endParaRPr>
           </a:p>
         </p:txBody>
       </p:sp>
@@ -16023,23 +15915,7 @@
                   <a:schemeClr val="bg1"/>
                 </a:solidFill>
               </a:rPr>
-              <a:t>SQL Commands – 	</a:t>
-            </a:r>
-            <a:r>
-              <a:rPr lang="en-US" sz="3200" b="1" dirty="0" smtClean="0">
-                <a:solidFill>
-                  <a:schemeClr val="bg1"/>
-                </a:solidFill>
-              </a:rPr>
-              <a:t>BETWEEN </a:t>
-            </a:r>
-            <a:r>
-              <a:rPr lang="en-US" sz="3200" b="1" dirty="0" smtClean="0">
-                <a:solidFill>
-                  <a:schemeClr val="bg1"/>
-                </a:solidFill>
-              </a:rPr>
-              <a:t>operator</a:t>
+              <a:t>SQL Commands – 	BETWEEN operator</a:t>
             </a:r>
             <a:endParaRPr lang="en-US" sz="3200" b="1" dirty="0">
               <a:solidFill>
@@ -19200,15 +19076,7 @@
                   <a:schemeClr val="bg1"/>
                 </a:solidFill>
               </a:rPr>
-              <a:t>	</a:t>
-            </a:r>
-            <a:r>
-              <a:rPr lang="en-US" sz="2400" dirty="0">
-                <a:solidFill>
-                  <a:schemeClr val="bg1"/>
-                </a:solidFill>
-              </a:rPr>
-              <a:t>SELECT </a:t>
+              <a:t>	SELECT </a:t>
             </a:r>
             <a:r>
               <a:rPr lang="en-US" sz="2400" dirty="0" err="1">
@@ -19822,11 +19690,6 @@
               </a:rPr>
               <a:t>;</a:t>
             </a:r>
-            <a:endParaRPr lang="en-US" sz="2400" dirty="0">
-              <a:solidFill>
-                <a:schemeClr val="bg1"/>
-              </a:solidFill>
-            </a:endParaRPr>
           </a:p>
         </p:txBody>
       </p:sp>
@@ -20048,23 +19911,7 @@
                   <a:schemeClr val="bg1"/>
                 </a:solidFill>
               </a:rPr>
-              <a:t>SQL Joins – </a:t>
-            </a:r>
-            <a:r>
-              <a:rPr lang="en-US" sz="3200" b="1" dirty="0" smtClean="0">
-                <a:solidFill>
-                  <a:schemeClr val="bg1"/>
-                </a:solidFill>
-              </a:rPr>
-              <a:t>RIGHT </a:t>
-            </a:r>
-            <a:r>
-              <a:rPr lang="en-US" sz="3200" b="1" dirty="0" smtClean="0">
-                <a:solidFill>
-                  <a:schemeClr val="bg1"/>
-                </a:solidFill>
-              </a:rPr>
-              <a:t>JOIN</a:t>
+              <a:t>SQL Joins – RIGHT JOIN</a:t>
             </a:r>
             <a:endParaRPr lang="en-US" sz="3200" b="1" dirty="0">
               <a:solidFill>
@@ -20269,15 +20116,7 @@
                   <a:schemeClr val="bg1"/>
                 </a:solidFill>
               </a:rPr>
-              <a:t>	</a:t>
-            </a:r>
-            <a:r>
-              <a:rPr lang="en-US" sz="2400" dirty="0">
-                <a:solidFill>
-                  <a:schemeClr val="bg1"/>
-                </a:solidFill>
-              </a:rPr>
-              <a:t>SELECT </a:t>
+              <a:t>	SELECT </a:t>
             </a:r>
             <a:r>
               <a:rPr lang="en-US" sz="2400" dirty="0" err="1">
@@ -21001,23 +20840,7 @@
                   <a:schemeClr val="bg1"/>
                 </a:solidFill>
               </a:rPr>
-              <a:t>SQL Joins – </a:t>
-            </a:r>
-            <a:r>
-              <a:rPr lang="en-US" sz="3200" b="1" dirty="0" smtClean="0">
-                <a:solidFill>
-                  <a:schemeClr val="bg1"/>
-                </a:solidFill>
-              </a:rPr>
-              <a:t>FULL OUTER </a:t>
-            </a:r>
-            <a:r>
-              <a:rPr lang="en-US" sz="3200" b="1" dirty="0" smtClean="0">
-                <a:solidFill>
-                  <a:schemeClr val="bg1"/>
-                </a:solidFill>
-              </a:rPr>
-              <a:t>JOIN</a:t>
+              <a:t>SQL Joins – FULL OUTER JOIN</a:t>
             </a:r>
             <a:endParaRPr lang="en-US" sz="3200" b="1" dirty="0">
               <a:solidFill>
@@ -21225,15 +21048,7 @@
                   <a:schemeClr val="bg1"/>
                 </a:solidFill>
               </a:rPr>
-              <a:t>	</a:t>
-            </a:r>
-            <a:r>
-              <a:rPr lang="en-US" sz="2400" dirty="0">
-                <a:solidFill>
-                  <a:schemeClr val="bg1"/>
-                </a:solidFill>
-              </a:rPr>
-              <a:t>SELECT </a:t>
+              <a:t>	SELECT </a:t>
             </a:r>
             <a:r>
               <a:rPr lang="en-US" sz="2400" dirty="0" err="1">
@@ -21731,11 +21546,6 @@
               </a:rPr>
               <a:t>;</a:t>
             </a:r>
-            <a:endParaRPr lang="en-US" sz="2400" dirty="0">
-              <a:solidFill>
-                <a:schemeClr val="bg1"/>
-              </a:solidFill>
-            </a:endParaRPr>
           </a:p>
         </p:txBody>
       </p:sp>
@@ -22264,168 +22074,34 @@
           </a:p>
         </p:txBody>
       </p:sp>
-      <p:sp>
-        <p:nvSpPr>
-          <p:cNvPr id="5" name="TextBox 4"/>
-          <p:cNvSpPr txBox="1"/>
-          <p:nvPr/>
-        </p:nvSpPr>
-        <p:spPr>
-          <a:xfrm>
-            <a:off x="307974" y="262826"/>
-            <a:ext cx="11643619" cy="6442774"/>
-          </a:xfrm>
-          <a:prstGeom prst="rect">
-            <a:avLst/>
-          </a:prstGeom>
-          <a:solidFill>
-            <a:schemeClr val="tx1">
-              <a:lumMod val="95000"/>
-            </a:schemeClr>
-          </a:solidFill>
-        </p:spPr>
-        <p:txBody>
-          <a:bodyPr wrap="square" rtlCol="0">
-            <a:spAutoFit/>
-          </a:bodyPr>
-          <a:lstStyle/>
-          <a:p>
-            <a:endParaRPr lang="en-US" dirty="0"/>
-          </a:p>
-        </p:txBody>
-      </p:sp>
-      <p:cxnSp>
-        <p:nvCxnSpPr>
-          <p:cNvPr id="6" name="Straight Connector 5"/>
-          <p:cNvCxnSpPr/>
-          <p:nvPr/>
-        </p:nvCxnSpPr>
-        <p:spPr>
-          <a:xfrm flipV="1">
-            <a:off x="307974" y="1103086"/>
-            <a:ext cx="11643619" cy="58057"/>
-          </a:xfrm>
-          <a:prstGeom prst="line">
-            <a:avLst/>
-          </a:prstGeom>
-          <a:ln w="50800">
-            <a:solidFill>
-              <a:srgbClr val="C00000"/>
-            </a:solidFill>
-          </a:ln>
-        </p:spPr>
-        <p:style>
-          <a:lnRef idx="1">
-            <a:schemeClr val="accent1"/>
-          </a:lnRef>
-          <a:fillRef idx="0">
-            <a:schemeClr val="accent1"/>
-          </a:fillRef>
-          <a:effectRef idx="0">
-            <a:schemeClr val="accent1"/>
-          </a:effectRef>
-          <a:fontRef idx="minor">
-            <a:schemeClr val="tx1"/>
-          </a:fontRef>
-        </p:style>
-      </p:cxnSp>
-      <p:sp>
-        <p:nvSpPr>
-          <p:cNvPr id="7" name="TextBox 6"/>
-          <p:cNvSpPr txBox="1"/>
-          <p:nvPr/>
-        </p:nvSpPr>
-        <p:spPr>
-          <a:xfrm>
-            <a:off x="444820" y="390569"/>
-            <a:ext cx="7970518" cy="584775"/>
-          </a:xfrm>
-          <a:prstGeom prst="rect">
-            <a:avLst/>
-          </a:prstGeom>
-          <a:noFill/>
-        </p:spPr>
-        <p:txBody>
-          <a:bodyPr wrap="square" rtlCol="0">
-            <a:spAutoFit/>
-          </a:bodyPr>
-          <a:lstStyle/>
-          <a:p>
-            <a:r>
-              <a:rPr lang="en-US" sz="3200" b="1" dirty="0" smtClean="0">
-                <a:solidFill>
-                  <a:schemeClr val="bg1"/>
-                </a:solidFill>
-              </a:rPr>
-              <a:t>SQL - QUIZ</a:t>
-            </a:r>
-            <a:endParaRPr lang="en-US" sz="3200" b="1" dirty="0">
-              <a:solidFill>
-                <a:schemeClr val="bg1"/>
-              </a:solidFill>
-            </a:endParaRPr>
-          </a:p>
-        </p:txBody>
-      </p:sp>
-      <p:sp>
-        <p:nvSpPr>
-          <p:cNvPr id="9" name="TextBox 8"/>
-          <p:cNvSpPr txBox="1"/>
-          <p:nvPr/>
-        </p:nvSpPr>
-        <p:spPr>
-          <a:xfrm>
-            <a:off x="809312" y="1392766"/>
-            <a:ext cx="7942801" cy="830997"/>
-          </a:xfrm>
-          <a:prstGeom prst="rect">
-            <a:avLst/>
-          </a:prstGeom>
-          <a:noFill/>
-        </p:spPr>
-        <p:txBody>
-          <a:bodyPr wrap="square" rtlCol="0">
-            <a:spAutoFit/>
-          </a:bodyPr>
-          <a:lstStyle/>
-          <a:p>
-            <a:r>
-              <a:rPr lang="en-US" sz="2400" dirty="0">
-                <a:solidFill>
-                  <a:schemeClr val="bg1"/>
-                </a:solidFill>
-                <a:hlinkClick r:id="rId2"/>
-              </a:rPr>
-              <a:t>http://</a:t>
-            </a:r>
-            <a:r>
-              <a:rPr lang="en-US" sz="2400" dirty="0" smtClean="0">
-                <a:solidFill>
-                  <a:schemeClr val="bg1"/>
-                </a:solidFill>
-                <a:hlinkClick r:id="rId2"/>
-              </a:rPr>
-              <a:t>www.w3schools.com/quiztest/quiztest.asp?qtest=SQL</a:t>
-            </a:r>
-            <a:endParaRPr lang="en-US" sz="2400" dirty="0" smtClean="0">
-              <a:solidFill>
-                <a:schemeClr val="bg1"/>
-              </a:solidFill>
-            </a:endParaRPr>
-          </a:p>
-          <a:p>
-            <a:endParaRPr lang="en-US" sz="2400" dirty="0">
-              <a:solidFill>
-                <a:schemeClr val="bg1"/>
-              </a:solidFill>
-            </a:endParaRPr>
-          </a:p>
-        </p:txBody>
-      </p:sp>
+      <p:pic>
+        <p:nvPicPr>
+          <p:cNvPr id="10" name="Picture 9"/>
+          <p:cNvPicPr>
+            <a:picLocks noChangeAspect="1"/>
+          </p:cNvPicPr>
+          <p:nvPr/>
+        </p:nvPicPr>
+        <p:blipFill>
+          <a:blip r:embed="rId2"/>
+          <a:stretch>
+            <a:fillRect/>
+          </a:stretch>
+        </p:blipFill>
+        <p:spPr>
+          <a:xfrm>
+            <a:off x="155574" y="160338"/>
+            <a:ext cx="8874125" cy="6662549"/>
+          </a:xfrm>
+          <a:prstGeom prst="rect">
+            <a:avLst/>
+          </a:prstGeom>
+        </p:spPr>
+      </p:pic>
     </p:spTree>
     <p:extLst>
       <p:ext uri="{BB962C8B-B14F-4D97-AF65-F5344CB8AC3E}">
-        <p14:creationId xmlns:p14="http://schemas.microsoft.com/office/powerpoint/2010/main" val="3290435200"/>
+        <p14:creationId xmlns:p14="http://schemas.microsoft.com/office/powerpoint/2010/main" val="3785309219"/>
       </p:ext>
     </p:extLst>
   </p:cSld>
@@ -22547,173 +22223,317 @@
           </a:p>
         </p:txBody>
       </p:sp>
-      <p:sp>
-        <p:nvSpPr>
-          <p:cNvPr id="5" name="TextBox 4"/>
-          <p:cNvSpPr txBox="1"/>
-          <p:nvPr/>
-        </p:nvSpPr>
-        <p:spPr>
-          <a:xfrm>
-            <a:off x="811369" y="2240924"/>
-            <a:ext cx="7959144" cy="4353059"/>
-          </a:xfrm>
-          <a:prstGeom prst="rect">
-            <a:avLst/>
-          </a:prstGeom>
-          <a:noFill/>
-        </p:spPr>
-        <p:txBody>
-          <a:bodyPr wrap="square" rtlCol="0">
-            <a:spAutoFit/>
-          </a:bodyPr>
-          <a:lstStyle/>
-          <a:p>
-            <a:endParaRPr lang="en-US" dirty="0"/>
-          </a:p>
-        </p:txBody>
-      </p:sp>
-      <p:sp>
-        <p:nvSpPr>
-          <p:cNvPr id="3" name="TextBox 2"/>
-          <p:cNvSpPr txBox="1"/>
-          <p:nvPr/>
-        </p:nvSpPr>
-        <p:spPr>
-          <a:xfrm>
-            <a:off x="460375" y="524435"/>
-            <a:ext cx="9853519" cy="6370975"/>
-          </a:xfrm>
-          <a:prstGeom prst="rect">
-            <a:avLst/>
-          </a:prstGeom>
-          <a:noFill/>
-        </p:spPr>
-        <p:txBody>
-          <a:bodyPr wrap="square" rtlCol="0">
-            <a:spAutoFit/>
-          </a:bodyPr>
-          <a:lstStyle/>
-          <a:p>
-            <a:r>
-              <a:rPr lang="en-US" sz="3600" b="1" dirty="0" smtClean="0"/>
-              <a:t>References:</a:t>
-            </a:r>
-          </a:p>
-          <a:p>
-            <a:r>
-              <a:rPr lang="en-US" sz="2400" b="1" dirty="0">
-                <a:hlinkClick r:id="rId2"/>
-              </a:rPr>
-              <a:t>http://</a:t>
-            </a:r>
-            <a:r>
-              <a:rPr lang="en-US" sz="2400" b="1" dirty="0" smtClean="0">
-                <a:hlinkClick r:id="rId2"/>
-              </a:rPr>
-              <a:t>www.slideshare.net/sakuvenderzira/c1-basic-concepts-of-database</a:t>
-            </a:r>
-            <a:endParaRPr lang="en-US" sz="2400" b="1" dirty="0" smtClean="0"/>
-          </a:p>
-          <a:p>
-            <a:r>
-              <a:rPr lang="en-US" sz="2400" b="1" dirty="0">
-                <a:hlinkClick r:id="rId3"/>
-              </a:rPr>
-              <a:t>http://</a:t>
-            </a:r>
-            <a:r>
-              <a:rPr lang="en-US" sz="2400" b="1" dirty="0" smtClean="0">
-                <a:hlinkClick r:id="rId3"/>
-              </a:rPr>
-              <a:t>www.slideshare.net/1keydata/sql-tutorial-basic-commands</a:t>
-            </a:r>
-            <a:endParaRPr lang="en-US" sz="2400" b="1" dirty="0" smtClean="0"/>
-          </a:p>
-          <a:p>
-            <a:r>
-              <a:rPr lang="en-US" sz="2400" b="1" dirty="0">
-                <a:hlinkClick r:id="rId4"/>
-              </a:rPr>
-              <a:t>http://</a:t>
-            </a:r>
-            <a:r>
-              <a:rPr lang="en-US" sz="2400" b="1" dirty="0" smtClean="0">
-                <a:hlinkClick r:id="rId4"/>
-              </a:rPr>
-              <a:t>www.w3schools.com/sql</a:t>
-            </a:r>
-            <a:endParaRPr lang="en-US" sz="2400" b="1" dirty="0" smtClean="0"/>
-          </a:p>
-          <a:p>
-            <a:endParaRPr lang="en-US" sz="2400" b="1" dirty="0"/>
-          </a:p>
-          <a:p>
-            <a:r>
-              <a:rPr lang="en-US" sz="3600" b="1" dirty="0"/>
-              <a:t>Further Reading:</a:t>
-            </a:r>
-          </a:p>
-          <a:p>
-            <a:r>
-              <a:rPr lang="en-US" sz="2400" b="1" dirty="0">
-                <a:hlinkClick r:id="rId4"/>
-              </a:rPr>
-              <a:t>http://</a:t>
-            </a:r>
-            <a:r>
-              <a:rPr lang="en-US" sz="2400" b="1" dirty="0" smtClean="0">
-                <a:hlinkClick r:id="rId4"/>
-              </a:rPr>
-              <a:t>www.w3schools.com/sql</a:t>
-            </a:r>
-            <a:endParaRPr lang="en-US" sz="2400" b="1" dirty="0" smtClean="0"/>
-          </a:p>
-          <a:p>
-            <a:r>
-              <a:rPr lang="en-US" sz="2400" b="1" dirty="0">
-                <a:hlinkClick r:id="rId5"/>
-              </a:rPr>
-              <a:t>http://</a:t>
-            </a:r>
-            <a:r>
-              <a:rPr lang="en-US" sz="2400" b="1" dirty="0" smtClean="0">
-                <a:hlinkClick r:id="rId5"/>
-              </a:rPr>
-              <a:t>downloads.mysql.com/docs/refman-5.5-en.a4.pdf</a:t>
-            </a:r>
-            <a:endParaRPr lang="en-US" sz="2400" b="1" dirty="0" smtClean="0"/>
-          </a:p>
-          <a:p>
-            <a:endParaRPr lang="en-US" sz="2400" b="1" dirty="0" smtClean="0"/>
-          </a:p>
-          <a:p>
-            <a:endParaRPr lang="en-US" sz="2400" b="1" dirty="0"/>
-          </a:p>
-          <a:p>
-            <a:endParaRPr lang="en-US" sz="2400" b="1" dirty="0" smtClean="0"/>
-          </a:p>
-          <a:p>
-            <a:endParaRPr lang="en-US" sz="2400" b="1" dirty="0"/>
-          </a:p>
-          <a:p>
-            <a:endParaRPr lang="en-US" sz="2400" b="1" dirty="0" smtClean="0"/>
-          </a:p>
-          <a:p>
-            <a:endParaRPr lang="en-US" sz="2400" b="1" dirty="0" smtClean="0"/>
-          </a:p>
-          <a:p>
-            <a:endParaRPr lang="en-US" sz="2400" b="1" dirty="0" smtClean="0"/>
-          </a:p>
-          <a:p>
-            <a:endParaRPr lang="en-US" sz="2400" b="1" dirty="0"/>
-          </a:p>
-        </p:txBody>
-      </p:sp>
+      <p:pic>
+        <p:nvPicPr>
+          <p:cNvPr id="5" name="Picture 4"/>
+          <p:cNvPicPr>
+            <a:picLocks noChangeAspect="1"/>
+          </p:cNvPicPr>
+          <p:nvPr/>
+        </p:nvPicPr>
+        <p:blipFill>
+          <a:blip r:embed="rId2"/>
+          <a:stretch>
+            <a:fillRect/>
+          </a:stretch>
+        </p:blipFill>
+        <p:spPr>
+          <a:xfrm>
+            <a:off x="155574" y="186699"/>
+            <a:ext cx="8702675" cy="6533827"/>
+          </a:xfrm>
+          <a:prstGeom prst="rect">
+            <a:avLst/>
+          </a:prstGeom>
+        </p:spPr>
+      </p:pic>
     </p:spTree>
     <p:extLst>
       <p:ext uri="{BB962C8B-B14F-4D97-AF65-F5344CB8AC3E}">
-        <p14:creationId xmlns:p14="http://schemas.microsoft.com/office/powerpoint/2010/main" val="3823283436"/>
+        <p14:creationId xmlns:p14="http://schemas.microsoft.com/office/powerpoint/2010/main" val="2520403376"/>
+      </p:ext>
+    </p:extLst>
+  </p:cSld>
+  <p:clrMapOvr>
+    <a:masterClrMapping/>
+  </p:clrMapOvr>
+  <p:timing>
+    <p:tnLst>
+      <p:par>
+        <p:cTn id="1" dur="indefinite" restart="never" nodeType="tmRoot"/>
+      </p:par>
+    </p:tnLst>
+  </p:timing>
+</p:sld>
+</file>
+
+<file path=ppt/slides/slide49.xml><?xml version="1.0" encoding="utf-8"?>
+<p:sld xmlns:a="http://schemas.openxmlformats.org/drawingml/2006/main" xmlns:r="http://schemas.openxmlformats.org/officeDocument/2006/relationships" xmlns:p="http://schemas.openxmlformats.org/presentationml/2006/main">
+  <p:cSld>
+    <p:spTree>
+      <p:nvGrpSpPr>
+        <p:cNvPr id="1" name=""/>
+        <p:cNvGrpSpPr/>
+        <p:nvPr/>
+      </p:nvGrpSpPr>
+      <p:grpSpPr>
+        <a:xfrm>
+          <a:off x="0" y="0"/>
+          <a:ext cx="0" cy="0"/>
+          <a:chOff x="0" y="0"/>
+          <a:chExt cx="0" cy="0"/>
+        </a:xfrm>
+      </p:grpSpPr>
+      <p:sp>
+        <p:nvSpPr>
+          <p:cNvPr id="2" name="Title 1"/>
+          <p:cNvSpPr>
+            <a:spLocks noGrp="1"/>
+          </p:cNvSpPr>
+          <p:nvPr>
+            <p:ph type="title"/>
+          </p:nvPr>
+        </p:nvSpPr>
+        <p:spPr/>
+        <p:txBody>
+          <a:bodyPr/>
+          <a:lstStyle/>
+          <a:p>
+            <a:r>
+              <a:rPr lang="en-US" dirty="0" smtClean="0"/>
+              <a:t>exceptions</a:t>
+            </a:r>
+            <a:endParaRPr lang="en-US" dirty="0"/>
+          </a:p>
+        </p:txBody>
+      </p:sp>
+      <p:sp>
+        <p:nvSpPr>
+          <p:cNvPr id="4" name="AutoShape 8" descr="http://www.penjee.com/programming/wp-content/uploads/2014/05/parameter-vs-argument-diagram.png"/>
+          <p:cNvSpPr>
+            <a:spLocks noChangeAspect="1" noChangeArrowheads="1"/>
+          </p:cNvSpPr>
+          <p:nvPr/>
+        </p:nvSpPr>
+        <p:spPr bwMode="auto">
+          <a:xfrm>
+            <a:off x="155575" y="-144463"/>
+            <a:ext cx="304800" cy="304801"/>
+          </a:xfrm>
+          <a:prstGeom prst="rect">
+            <a:avLst/>
+          </a:prstGeom>
+          <a:noFill/>
+          <a:extLst>
+            <a:ext uri="{909E8E84-426E-40DD-AFC4-6F175D3DCCD1}">
+              <a14:hiddenFill xmlns:a14="http://schemas.microsoft.com/office/drawing/2010/main">
+                <a:solidFill>
+                  <a:srgbClr val="FFFFFF"/>
+                </a:solidFill>
+              </a14:hiddenFill>
+            </a:ext>
+          </a:extLst>
+        </p:spPr>
+        <p:txBody>
+          <a:bodyPr vert="horz" wrap="square" lIns="91440" tIns="45720" rIns="91440" bIns="45720" numCol="1" anchor="t" anchorCtr="0" compatLnSpc="1">
+            <a:prstTxWarp prst="textNoShape">
+              <a:avLst/>
+            </a:prstTxWarp>
+          </a:bodyPr>
+          <a:lstStyle/>
+          <a:p>
+            <a:endParaRPr lang="en-US"/>
+          </a:p>
+        </p:txBody>
+      </p:sp>
+      <p:sp>
+        <p:nvSpPr>
+          <p:cNvPr id="8" name="TextBox 7"/>
+          <p:cNvSpPr txBox="1"/>
+          <p:nvPr/>
+        </p:nvSpPr>
+        <p:spPr>
+          <a:xfrm>
+            <a:off x="7495504" y="2240924"/>
+            <a:ext cx="4456090" cy="400110"/>
+          </a:xfrm>
+          <a:prstGeom prst="rect">
+            <a:avLst/>
+          </a:prstGeom>
+          <a:noFill/>
+        </p:spPr>
+        <p:txBody>
+          <a:bodyPr wrap="square" rtlCol="0">
+            <a:spAutoFit/>
+          </a:bodyPr>
+          <a:lstStyle/>
+          <a:p>
+            <a:endParaRPr lang="en-US" sz="2000" u="sng" dirty="0"/>
+          </a:p>
+        </p:txBody>
+      </p:sp>
+      <p:sp>
+        <p:nvSpPr>
+          <p:cNvPr id="5" name="TextBox 4"/>
+          <p:cNvSpPr txBox="1"/>
+          <p:nvPr/>
+        </p:nvSpPr>
+        <p:spPr>
+          <a:xfrm>
+            <a:off x="307974" y="262826"/>
+            <a:ext cx="11643619" cy="6442774"/>
+          </a:xfrm>
+          <a:prstGeom prst="rect">
+            <a:avLst/>
+          </a:prstGeom>
+          <a:solidFill>
+            <a:schemeClr val="tx1">
+              <a:lumMod val="95000"/>
+            </a:schemeClr>
+          </a:solidFill>
+        </p:spPr>
+        <p:txBody>
+          <a:bodyPr wrap="square" rtlCol="0">
+            <a:spAutoFit/>
+          </a:bodyPr>
+          <a:lstStyle/>
+          <a:p>
+            <a:endParaRPr lang="en-US" dirty="0"/>
+          </a:p>
+        </p:txBody>
+      </p:sp>
+      <p:cxnSp>
+        <p:nvCxnSpPr>
+          <p:cNvPr id="6" name="Straight Connector 5"/>
+          <p:cNvCxnSpPr/>
+          <p:nvPr/>
+        </p:nvCxnSpPr>
+        <p:spPr>
+          <a:xfrm flipV="1">
+            <a:off x="307974" y="1103086"/>
+            <a:ext cx="11643619" cy="58057"/>
+          </a:xfrm>
+          <a:prstGeom prst="line">
+            <a:avLst/>
+          </a:prstGeom>
+          <a:ln w="50800">
+            <a:solidFill>
+              <a:srgbClr val="C00000"/>
+            </a:solidFill>
+          </a:ln>
+        </p:spPr>
+        <p:style>
+          <a:lnRef idx="1">
+            <a:schemeClr val="accent1"/>
+          </a:lnRef>
+          <a:fillRef idx="0">
+            <a:schemeClr val="accent1"/>
+          </a:fillRef>
+          <a:effectRef idx="0">
+            <a:schemeClr val="accent1"/>
+          </a:effectRef>
+          <a:fontRef idx="minor">
+            <a:schemeClr val="tx1"/>
+          </a:fontRef>
+        </p:style>
+      </p:cxnSp>
+      <p:sp>
+        <p:nvSpPr>
+          <p:cNvPr id="7" name="TextBox 6"/>
+          <p:cNvSpPr txBox="1"/>
+          <p:nvPr/>
+        </p:nvSpPr>
+        <p:spPr>
+          <a:xfrm>
+            <a:off x="444820" y="390569"/>
+            <a:ext cx="7970518" cy="584775"/>
+          </a:xfrm>
+          <a:prstGeom prst="rect">
+            <a:avLst/>
+          </a:prstGeom>
+          <a:noFill/>
+        </p:spPr>
+        <p:txBody>
+          <a:bodyPr wrap="square" rtlCol="0">
+            <a:spAutoFit/>
+          </a:bodyPr>
+          <a:lstStyle/>
+          <a:p>
+            <a:r>
+              <a:rPr lang="en-US" sz="3200" b="1" dirty="0" smtClean="0">
+                <a:solidFill>
+                  <a:schemeClr val="bg1"/>
+                </a:solidFill>
+              </a:rPr>
+              <a:t>SQL - QUIZ</a:t>
+            </a:r>
+            <a:endParaRPr lang="en-US" sz="3200" b="1" dirty="0">
+              <a:solidFill>
+                <a:schemeClr val="bg1"/>
+              </a:solidFill>
+            </a:endParaRPr>
+          </a:p>
+        </p:txBody>
+      </p:sp>
+      <p:sp>
+        <p:nvSpPr>
+          <p:cNvPr id="9" name="TextBox 8"/>
+          <p:cNvSpPr txBox="1"/>
+          <p:nvPr/>
+        </p:nvSpPr>
+        <p:spPr>
+          <a:xfrm>
+            <a:off x="809312" y="1392766"/>
+            <a:ext cx="7942801" cy="830997"/>
+          </a:xfrm>
+          <a:prstGeom prst="rect">
+            <a:avLst/>
+          </a:prstGeom>
+          <a:noFill/>
+        </p:spPr>
+        <p:txBody>
+          <a:bodyPr wrap="square" rtlCol="0">
+            <a:spAutoFit/>
+          </a:bodyPr>
+          <a:lstStyle/>
+          <a:p>
+            <a:r>
+              <a:rPr lang="en-US" sz="2400" dirty="0">
+                <a:solidFill>
+                  <a:schemeClr val="bg1"/>
+                </a:solidFill>
+                <a:hlinkClick r:id="rId2"/>
+              </a:rPr>
+              <a:t>http://</a:t>
+            </a:r>
+            <a:r>
+              <a:rPr lang="en-US" sz="2400" dirty="0" smtClean="0">
+                <a:solidFill>
+                  <a:schemeClr val="bg1"/>
+                </a:solidFill>
+                <a:hlinkClick r:id="rId2"/>
+              </a:rPr>
+              <a:t>www.w3schools.com/quiztest/quiztest.asp?qtest=SQL</a:t>
+            </a:r>
+            <a:endParaRPr lang="en-US" sz="2400" dirty="0" smtClean="0">
+              <a:solidFill>
+                <a:schemeClr val="bg1"/>
+              </a:solidFill>
+            </a:endParaRPr>
+          </a:p>
+          <a:p>
+            <a:endParaRPr lang="en-US" sz="2400" dirty="0">
+              <a:solidFill>
+                <a:schemeClr val="bg1"/>
+              </a:solidFill>
+            </a:endParaRPr>
+          </a:p>
+        </p:txBody>
+      </p:sp>
+    </p:spTree>
+    <p:extLst>
+      <p:ext uri="{BB962C8B-B14F-4D97-AF65-F5344CB8AC3E}">
+        <p14:creationId xmlns:p14="http://schemas.microsoft.com/office/powerpoint/2010/main" val="3290435200"/>
       </p:ext>
     </p:extLst>
   </p:cSld>
@@ -22913,6 +22733,312 @@
     <p:extLst>
       <p:ext uri="{BB962C8B-B14F-4D97-AF65-F5344CB8AC3E}">
         <p14:creationId xmlns:p14="http://schemas.microsoft.com/office/powerpoint/2010/main" val="3184821746"/>
+      </p:ext>
+    </p:extLst>
+  </p:cSld>
+  <p:clrMapOvr>
+    <a:masterClrMapping/>
+  </p:clrMapOvr>
+  <p:timing>
+    <p:tnLst>
+      <p:par>
+        <p:cTn id="1" dur="indefinite" restart="never" nodeType="tmRoot"/>
+      </p:par>
+    </p:tnLst>
+  </p:timing>
+</p:sld>
+</file>
+
+<file path=ppt/slides/slide50.xml><?xml version="1.0" encoding="utf-8"?>
+<p:sld xmlns:a="http://schemas.openxmlformats.org/drawingml/2006/main" xmlns:r="http://schemas.openxmlformats.org/officeDocument/2006/relationships" xmlns:p="http://schemas.openxmlformats.org/presentationml/2006/main">
+  <p:cSld>
+    <p:spTree>
+      <p:nvGrpSpPr>
+        <p:cNvPr id="1" name=""/>
+        <p:cNvGrpSpPr/>
+        <p:nvPr/>
+      </p:nvGrpSpPr>
+      <p:grpSpPr>
+        <a:xfrm>
+          <a:off x="0" y="0"/>
+          <a:ext cx="0" cy="0"/>
+          <a:chOff x="0" y="0"/>
+          <a:chExt cx="0" cy="0"/>
+        </a:xfrm>
+      </p:grpSpPr>
+      <p:sp>
+        <p:nvSpPr>
+          <p:cNvPr id="2" name="Title 1"/>
+          <p:cNvSpPr>
+            <a:spLocks noGrp="1"/>
+          </p:cNvSpPr>
+          <p:nvPr>
+            <p:ph type="title"/>
+          </p:nvPr>
+        </p:nvSpPr>
+        <p:spPr/>
+        <p:txBody>
+          <a:bodyPr/>
+          <a:lstStyle/>
+          <a:p>
+            <a:r>
+              <a:rPr lang="en-US" dirty="0" smtClean="0"/>
+              <a:t>exceptions</a:t>
+            </a:r>
+            <a:endParaRPr lang="en-US" dirty="0"/>
+          </a:p>
+        </p:txBody>
+      </p:sp>
+      <p:sp>
+        <p:nvSpPr>
+          <p:cNvPr id="4" name="AutoShape 8" descr="http://www.penjee.com/programming/wp-content/uploads/2014/05/parameter-vs-argument-diagram.png"/>
+          <p:cNvSpPr>
+            <a:spLocks noChangeAspect="1" noChangeArrowheads="1"/>
+          </p:cNvSpPr>
+          <p:nvPr/>
+        </p:nvSpPr>
+        <p:spPr bwMode="auto">
+          <a:xfrm>
+            <a:off x="155575" y="-144463"/>
+            <a:ext cx="304800" cy="304801"/>
+          </a:xfrm>
+          <a:prstGeom prst="rect">
+            <a:avLst/>
+          </a:prstGeom>
+          <a:noFill/>
+          <a:extLst>
+            <a:ext uri="{909E8E84-426E-40DD-AFC4-6F175D3DCCD1}">
+              <a14:hiddenFill xmlns:a14="http://schemas.microsoft.com/office/drawing/2010/main">
+                <a:solidFill>
+                  <a:srgbClr val="FFFFFF"/>
+                </a:solidFill>
+              </a14:hiddenFill>
+            </a:ext>
+          </a:extLst>
+        </p:spPr>
+        <p:txBody>
+          <a:bodyPr vert="horz" wrap="square" lIns="91440" tIns="45720" rIns="91440" bIns="45720" numCol="1" anchor="t" anchorCtr="0" compatLnSpc="1">
+            <a:prstTxWarp prst="textNoShape">
+              <a:avLst/>
+            </a:prstTxWarp>
+          </a:bodyPr>
+          <a:lstStyle/>
+          <a:p>
+            <a:endParaRPr lang="en-US"/>
+          </a:p>
+        </p:txBody>
+      </p:sp>
+      <p:sp>
+        <p:nvSpPr>
+          <p:cNvPr id="8" name="TextBox 7"/>
+          <p:cNvSpPr txBox="1"/>
+          <p:nvPr/>
+        </p:nvSpPr>
+        <p:spPr>
+          <a:xfrm>
+            <a:off x="7495504" y="2240924"/>
+            <a:ext cx="4456090" cy="400110"/>
+          </a:xfrm>
+          <a:prstGeom prst="rect">
+            <a:avLst/>
+          </a:prstGeom>
+          <a:noFill/>
+        </p:spPr>
+        <p:txBody>
+          <a:bodyPr wrap="square" rtlCol="0">
+            <a:spAutoFit/>
+          </a:bodyPr>
+          <a:lstStyle/>
+          <a:p>
+            <a:endParaRPr lang="en-US" sz="2000" u="sng" dirty="0"/>
+          </a:p>
+        </p:txBody>
+      </p:sp>
+      <p:sp>
+        <p:nvSpPr>
+          <p:cNvPr id="5" name="TextBox 4"/>
+          <p:cNvSpPr txBox="1"/>
+          <p:nvPr/>
+        </p:nvSpPr>
+        <p:spPr>
+          <a:xfrm>
+            <a:off x="811369" y="2240924"/>
+            <a:ext cx="7959144" cy="4353059"/>
+          </a:xfrm>
+          <a:prstGeom prst="rect">
+            <a:avLst/>
+          </a:prstGeom>
+          <a:noFill/>
+        </p:spPr>
+        <p:txBody>
+          <a:bodyPr wrap="square" rtlCol="0">
+            <a:spAutoFit/>
+          </a:bodyPr>
+          <a:lstStyle/>
+          <a:p>
+            <a:endParaRPr lang="en-US" dirty="0"/>
+          </a:p>
+        </p:txBody>
+      </p:sp>
+      <p:sp>
+        <p:nvSpPr>
+          <p:cNvPr id="3" name="TextBox 2"/>
+          <p:cNvSpPr txBox="1"/>
+          <p:nvPr/>
+        </p:nvSpPr>
+        <p:spPr>
+          <a:xfrm>
+            <a:off x="460375" y="524435"/>
+            <a:ext cx="9853519" cy="7478970"/>
+          </a:xfrm>
+          <a:prstGeom prst="rect">
+            <a:avLst/>
+          </a:prstGeom>
+          <a:noFill/>
+        </p:spPr>
+        <p:txBody>
+          <a:bodyPr wrap="square" rtlCol="0">
+            <a:spAutoFit/>
+          </a:bodyPr>
+          <a:lstStyle/>
+          <a:p>
+            <a:r>
+              <a:rPr lang="en-US" sz="3600" b="1" dirty="0" smtClean="0"/>
+              <a:t>References:</a:t>
+            </a:r>
+          </a:p>
+          <a:p>
+            <a:r>
+              <a:rPr lang="en-US" sz="2400" b="1" dirty="0">
+                <a:hlinkClick r:id="rId2"/>
+              </a:rPr>
+              <a:t>http://</a:t>
+            </a:r>
+            <a:r>
+              <a:rPr lang="en-US" sz="2400" b="1" dirty="0" smtClean="0">
+                <a:hlinkClick r:id="rId2"/>
+              </a:rPr>
+              <a:t>www.slideshare.net/sakuvenderzira/c1-basic-concepts-of-database</a:t>
+            </a:r>
+            <a:endParaRPr lang="en-US" sz="2400" b="1" dirty="0" smtClean="0"/>
+          </a:p>
+          <a:p>
+            <a:r>
+              <a:rPr lang="en-US" sz="2400" b="1" dirty="0">
+                <a:hlinkClick r:id="rId3"/>
+              </a:rPr>
+              <a:t>http://</a:t>
+            </a:r>
+            <a:r>
+              <a:rPr lang="en-US" sz="2400" b="1" dirty="0" smtClean="0">
+                <a:hlinkClick r:id="rId3"/>
+              </a:rPr>
+              <a:t>www.slideshare.net/1keydata/sql-tutorial-basic-commands</a:t>
+            </a:r>
+            <a:endParaRPr lang="en-US" sz="2400" b="1" dirty="0" smtClean="0"/>
+          </a:p>
+          <a:p>
+            <a:r>
+              <a:rPr lang="en-US" sz="2400" b="1" dirty="0">
+                <a:hlinkClick r:id="rId4"/>
+              </a:rPr>
+              <a:t>http://</a:t>
+            </a:r>
+            <a:r>
+              <a:rPr lang="en-US" sz="2400" b="1" dirty="0" smtClean="0">
+                <a:hlinkClick r:id="rId4"/>
+              </a:rPr>
+              <a:t>www.w3schools.com/sql</a:t>
+            </a:r>
+            <a:endParaRPr lang="en-US" sz="2400" b="1" dirty="0" smtClean="0"/>
+          </a:p>
+          <a:p>
+            <a:r>
+              <a:rPr lang="en-US" sz="2400" b="1" dirty="0">
+                <a:hlinkClick r:id="rId5"/>
+              </a:rPr>
+              <a:t>http://</a:t>
+            </a:r>
+            <a:r>
+              <a:rPr lang="en-US" sz="2400" b="1" dirty="0" smtClean="0">
+                <a:hlinkClick r:id="rId5"/>
+              </a:rPr>
+              <a:t>www.slideshare.net/BaabtraMentoringPartner/stored-procedure-25160892</a:t>
+            </a:r>
+            <a:endParaRPr lang="en-US" sz="2400" b="1" dirty="0" smtClean="0"/>
+          </a:p>
+          <a:p>
+            <a:endParaRPr lang="en-US" sz="2400" b="1" dirty="0" smtClean="0"/>
+          </a:p>
+          <a:p>
+            <a:endParaRPr lang="en-US" sz="2400" b="1" dirty="0"/>
+          </a:p>
+          <a:p>
+            <a:r>
+              <a:rPr lang="en-US" sz="3600" b="1" dirty="0"/>
+              <a:t>Further Reading:</a:t>
+            </a:r>
+          </a:p>
+          <a:p>
+            <a:r>
+              <a:rPr lang="en-US" sz="2400" b="1" dirty="0">
+                <a:hlinkClick r:id="rId4"/>
+              </a:rPr>
+              <a:t>http://</a:t>
+            </a:r>
+            <a:r>
+              <a:rPr lang="en-US" sz="2400" b="1" dirty="0" smtClean="0">
+                <a:hlinkClick r:id="rId4"/>
+              </a:rPr>
+              <a:t>www.w3schools.com/sql</a:t>
+            </a:r>
+            <a:endParaRPr lang="en-US" sz="2400" b="1" dirty="0" smtClean="0"/>
+          </a:p>
+          <a:p>
+            <a:r>
+              <a:rPr lang="en-US" sz="2400" b="1" dirty="0">
+                <a:hlinkClick r:id="rId6"/>
+              </a:rPr>
+              <a:t>http://</a:t>
+            </a:r>
+            <a:r>
+              <a:rPr lang="en-US" sz="2400" b="1" dirty="0" smtClean="0">
+                <a:hlinkClick r:id="rId6"/>
+              </a:rPr>
+              <a:t>downloads.mysql.com/docs/refman-5.5-en.a4.pdf</a:t>
+            </a:r>
+            <a:endParaRPr lang="en-US" sz="2400" b="1" dirty="0" smtClean="0"/>
+          </a:p>
+          <a:p>
+            <a:endParaRPr lang="en-US" sz="2400" b="1" dirty="0" smtClean="0"/>
+          </a:p>
+          <a:p>
+            <a:endParaRPr lang="en-US" sz="2400" b="1" dirty="0"/>
+          </a:p>
+          <a:p>
+            <a:endParaRPr lang="en-US" sz="2400" b="1" dirty="0" smtClean="0"/>
+          </a:p>
+          <a:p>
+            <a:endParaRPr lang="en-US" sz="2400" b="1" dirty="0"/>
+          </a:p>
+          <a:p>
+            <a:endParaRPr lang="en-US" sz="2400" b="1" dirty="0" smtClean="0"/>
+          </a:p>
+          <a:p>
+            <a:endParaRPr lang="en-US" sz="2400" b="1" dirty="0" smtClean="0"/>
+          </a:p>
+          <a:p>
+            <a:endParaRPr lang="en-US" sz="2400" b="1" dirty="0" smtClean="0"/>
+          </a:p>
+          <a:p>
+            <a:endParaRPr lang="en-US" sz="2400" b="1" dirty="0"/>
+          </a:p>
+        </p:txBody>
+      </p:sp>
+    </p:spTree>
+    <p:extLst>
+      <p:ext uri="{BB962C8B-B14F-4D97-AF65-F5344CB8AC3E}">
+        <p14:creationId xmlns:p14="http://schemas.microsoft.com/office/powerpoint/2010/main" val="3823283436"/>
       </p:ext>
     </p:extLst>
   </p:cSld>

</xml_diff>